<commit_message>
LE TRAVAIL DE LA SEMAINE
</commit_message>
<xml_diff>
--- a/Templates/testmercredi.pptx
+++ b/Templates/testmercredi.pptx
@@ -403,7 +403,7 @@
           <a:p>
             <a:fld id="{515CCE07-1711-4DC7-A7D8-7ED312C82FB8}" type="datetimeFigureOut">
               <a:rPr lang="fr-FR" smtClean="0"/>
-              <a:t>04/05/2022</a:t>
+              <a:t>06/05/2022</a:t>
             </a:fld>
             <a:endParaRPr lang="fr-FR"/>
           </a:p>
@@ -568,7 +568,7 @@
           <a:p>
             <a:fld id="{014ABEAC-8B63-4BD1-9569-A14EB8752A94}" type="datetimeFigureOut">
               <a:rPr lang="fr-FR" smtClean="0"/>
-              <a:t>04/05/2022</a:t>
+              <a:t>06/05/2022</a:t>
             </a:fld>
             <a:endParaRPr lang="fr-FR"/>
           </a:p>
@@ -18129,7 +18129,23 @@
                   <a:schemeClr val="tx2"/>
                 </a:solidFill>
               </a:rPr>
-              <a:t>À la date de constatation finale, le &lt;DCF&gt;, en l’absence de remboursement anticipé automatique préalable, on compare le &lt;SJR3&gt; de clôture &lt;SJR7&gt;</a:t>
+              <a:t>À la date de constatation finale, le </a:t>
+            </a:r>
+            <a:r>
+              <a:rPr lang="fr-FR" sz="800">
+                <a:solidFill>
+                  <a:schemeClr val="tx2"/>
+                </a:solidFill>
+              </a:rPr>
+              <a:t>&lt;DCFMAJ&gt;, </a:t>
+            </a:r>
+            <a:r>
+              <a:rPr lang="fr-FR" sz="800" dirty="0">
+                <a:solidFill>
+                  <a:schemeClr val="tx2"/>
+                </a:solidFill>
+              </a:rPr>
+              <a:t>en l’absence de remboursement anticipé automatique préalable, on compare le &lt;SJR3&gt; de clôture &lt;SJR7&gt;</a:t>
             </a:r>
             <a:r>
               <a:rPr lang="en-US" sz="800" dirty="0">
@@ -28258,18 +28274,10 @@
                   <a:schemeClr val="tx2"/>
                 </a:solidFill>
               </a:rPr>
-              <a:t>(&lt;NSF&gt; dans cet exemple). Le produit est automatiquement remboursé par anticipation. Il verse alors l’intégralité du capital initial majorée d’un &lt;GC&gt; de &lt;CPN&gt; par &lt;F0&gt; &lt;F2&gt; depuis le &lt;DDCI&gt;, soit un gain </a:t>
-            </a:r>
-            <a:r>
-              <a:rPr lang="fr-FR" sz="800">
-                <a:solidFill>
-                  <a:schemeClr val="tx2"/>
-                </a:solidFill>
-              </a:rPr>
-              <a:t>de </a:t>
-            </a:r>
-            <a:r>
-              <a:rPr lang="fr-FR" sz="800">
+              <a:t>(&lt;NSF&gt; dans cet exemple). Le produit est automatiquement remboursé par anticipation. Il verse alors l’intégralité du capital initial majorée d’un &lt;GC&gt; de &lt;CPN&gt; par &lt;F0&gt; &lt;F2&gt; depuis le &lt;DDCI&gt;, soit un gain de </a:t>
+            </a:r>
+            <a:r>
+              <a:rPr lang="fr-FR" sz="800" dirty="0">
                 <a:solidFill>
                   <a:schemeClr val="tx2"/>
                 </a:solidFill>
@@ -28280,20 +28288,12 @@
               <a:t>&lt;GCA&gt;</a:t>
             </a:r>
             <a:r>
-              <a:rPr lang="fr-FR" sz="800">
+              <a:rPr lang="fr-FR" sz="800" dirty="0">
                 <a:solidFill>
                   <a:schemeClr val="tx2"/>
                 </a:solidFill>
               </a:rPr>
-              <a:t> </a:t>
-            </a:r>
-            <a:r>
-              <a:rPr lang="fr-FR" sz="800" dirty="0">
-                <a:solidFill>
-                  <a:schemeClr val="tx2"/>
-                </a:solidFill>
-              </a:rPr>
-              <a:t>dans notre exemple.</a:t>
+              <a:t> dans notre exemple.</a:t>
             </a:r>
           </a:p>
           <a:p>
@@ -28394,7 +28394,7 @@
                   <a:schemeClr val="tx2"/>
                 </a:solidFill>
               </a:rPr>
-              <a:t>mécanisme de plafonnement des gains à &lt;CPN&gt; par &lt;F0&gt; &lt;F2&gt; depuis le &lt;DDCI&gt;.</a:t>
+              <a:t>mécanisme de plafonnement des gains à &lt;CPN&gt; par &lt;F0&gt; &lt;F2&gt; depuis le &lt;DDCIMAJ&gt;.</a:t>
             </a:r>
           </a:p>
         </p:txBody>
@@ -29252,6 +29252,14 @@
 </file>
 
 <file path=customXml/item1.xml><?xml version="1.0" encoding="utf-8"?>
+<p:properties xmlns:p="http://schemas.microsoft.com/office/2006/metadata/properties" xmlns:xsi="http://www.w3.org/2001/XMLSchema-instance" xmlns:pc="http://schemas.microsoft.com/office/infopath/2007/PartnerControls">
+  <documentManagement>
+    <_Flow_SignoffStatus xmlns="ef624bc2-1644-4d69-8362-5c28ca496374" xsi:nil="true"/>
+  </documentManagement>
+</p:properties>
+</file>
+
+<file path=customXml/item2.xml><?xml version="1.0" encoding="utf-8"?>
 <ct:contentTypeSchema xmlns:ct="http://schemas.microsoft.com/office/2006/metadata/contentType" xmlns:ma="http://schemas.microsoft.com/office/2006/metadata/properties/metaAttributes" ct:_="" ma:_="" ma:contentTypeName="Document" ma:contentTypeID="0x0101005DDE610BC516E448BB8152259F39635A" ma:contentTypeVersion="13" ma:contentTypeDescription="Crée un document." ma:contentTypeScope="" ma:versionID="4e51a0dab1f5d4663d954168d546c586">
   <xsd:schema xmlns:xsd="http://www.w3.org/2001/XMLSchema" xmlns:xs="http://www.w3.org/2001/XMLSchema" xmlns:p="http://schemas.microsoft.com/office/2006/metadata/properties" xmlns:ns2="ef624bc2-1644-4d69-8362-5c28ca496374" xmlns:ns3="514a554b-82b0-4359-b247-fc84018a95f0" targetNamespace="http://schemas.microsoft.com/office/2006/metadata/properties" ma:root="true" ma:fieldsID="d7b51e5f287975310341ecd8502634d3" ns2:_="" ns3:_="">
     <xsd:import namespace="ef624bc2-1644-4d69-8362-5c28ca496374"/>
@@ -29474,14 +29482,6 @@
 </ct:contentTypeSchema>
 </file>
 
-<file path=customXml/item2.xml><?xml version="1.0" encoding="utf-8"?>
-<p:properties xmlns:p="http://schemas.microsoft.com/office/2006/metadata/properties" xmlns:xsi="http://www.w3.org/2001/XMLSchema-instance" xmlns:pc="http://schemas.microsoft.com/office/infopath/2007/PartnerControls">
-  <documentManagement>
-    <_Flow_SignoffStatus xmlns="ef624bc2-1644-4d69-8362-5c28ca496374" xsi:nil="true"/>
-  </documentManagement>
-</p:properties>
-</file>
-
 <file path=customXml/item3.xml><?xml version="1.0" encoding="utf-8"?>
 <?mso-contentType ?>
 <FormTemplates xmlns="http://schemas.microsoft.com/sharepoint/v3/contenttype/forms">
@@ -29492,6 +29492,23 @@
 </file>
 
 <file path=customXml/itemProps1.xml><?xml version="1.0" encoding="utf-8"?>
+<ds:datastoreItem xmlns:ds="http://schemas.openxmlformats.org/officeDocument/2006/customXml" ds:itemID="{25DE574B-2CD2-4078-9BEA-2A14717D9698}">
+  <ds:schemaRefs>
+    <ds:schemaRef ds:uri="http://schemas.microsoft.com/office/2006/documentManagement/types"/>
+    <ds:schemaRef ds:uri="ef624bc2-1644-4d69-8362-5c28ca496374"/>
+    <ds:schemaRef ds:uri="http://purl.org/dc/terms/"/>
+    <ds:schemaRef ds:uri="http://purl.org/dc/dcmitype/"/>
+    <ds:schemaRef ds:uri="http://schemas.microsoft.com/office/infopath/2007/PartnerControls"/>
+    <ds:schemaRef ds:uri="http://schemas.openxmlformats.org/package/2006/metadata/core-properties"/>
+    <ds:schemaRef ds:uri="514a554b-82b0-4359-b247-fc84018a95f0"/>
+    <ds:schemaRef ds:uri="http://schemas.microsoft.com/office/2006/metadata/properties"/>
+    <ds:schemaRef ds:uri="http://www.w3.org/XML/1998/namespace"/>
+    <ds:schemaRef ds:uri="http://purl.org/dc/elements/1.1/"/>
+  </ds:schemaRefs>
+</ds:datastoreItem>
+</file>
+
+<file path=customXml/itemProps2.xml><?xml version="1.0" encoding="utf-8"?>
 <ds:datastoreItem xmlns:ds="http://schemas.openxmlformats.org/officeDocument/2006/customXml" ds:itemID="{41EF0323-6FE8-41A6-BEA1-CC5178579BBD}">
   <ds:schemaRefs>
     <ds:schemaRef ds:uri="http://schemas.microsoft.com/office/2006/metadata/contentType"/>
@@ -29510,23 +29527,6 @@
 </ds:datastoreItem>
 </file>
 
-<file path=customXml/itemProps2.xml><?xml version="1.0" encoding="utf-8"?>
-<ds:datastoreItem xmlns:ds="http://schemas.openxmlformats.org/officeDocument/2006/customXml" ds:itemID="{25DE574B-2CD2-4078-9BEA-2A14717D9698}">
-  <ds:schemaRefs>
-    <ds:schemaRef ds:uri="http://schemas.microsoft.com/office/2006/documentManagement/types"/>
-    <ds:schemaRef ds:uri="ef624bc2-1644-4d69-8362-5c28ca496374"/>
-    <ds:schemaRef ds:uri="http://purl.org/dc/terms/"/>
-    <ds:schemaRef ds:uri="http://purl.org/dc/dcmitype/"/>
-    <ds:schemaRef ds:uri="http://schemas.microsoft.com/office/infopath/2007/PartnerControls"/>
-    <ds:schemaRef ds:uri="http://schemas.openxmlformats.org/package/2006/metadata/core-properties"/>
-    <ds:schemaRef ds:uri="514a554b-82b0-4359-b247-fc84018a95f0"/>
-    <ds:schemaRef ds:uri="http://schemas.microsoft.com/office/2006/metadata/properties"/>
-    <ds:schemaRef ds:uri="http://www.w3.org/XML/1998/namespace"/>
-    <ds:schemaRef ds:uri="http://purl.org/dc/elements/1.1/"/>
-  </ds:schemaRefs>
-</ds:datastoreItem>
-</file>
-
 <file path=customXml/itemProps3.xml><?xml version="1.0" encoding="utf-8"?>
 <ds:datastoreItem xmlns:ds="http://schemas.openxmlformats.org/officeDocument/2006/customXml" ds:itemID="{B00FC41E-FBDE-42E2-B58A-20EBD240A376}">
   <ds:schemaRefs>

</xml_diff>

<commit_message>
[add] correction bug array
</commit_message>
<xml_diff>
--- a/Templates/testmercredi.pptx
+++ b/Templates/testmercredi.pptx
@@ -403,7 +403,7 @@
           <a:p>
             <a:fld id="{515CCE07-1711-4DC7-A7D8-7ED312C82FB8}" type="datetimeFigureOut">
               <a:rPr lang="fr-FR" smtClean="0"/>
-              <a:t>06/05/2022</a:t>
+              <a:t>09/05/2022</a:t>
             </a:fld>
             <a:endParaRPr lang="fr-FR"/>
           </a:p>
@@ -568,7 +568,7 @@
           <a:p>
             <a:fld id="{014ABEAC-8B63-4BD1-9569-A14EB8752A94}" type="datetimeFigureOut">
               <a:rPr lang="fr-FR" smtClean="0"/>
-              <a:t>06/05/2022</a:t>
+              <a:t>09/05/2022</a:t>
             </a:fld>
             <a:endParaRPr lang="fr-FR"/>
           </a:p>
@@ -6029,6 +6029,537 @@
           </a:p>
         </p:txBody>
       </p:sp>
+      <p:graphicFrame>
+        <p:nvGraphicFramePr>
+          <p:cNvPr id="18" name="Tableau 17">
+            <a:extLst>
+              <a:ext uri="{FF2B5EF4-FFF2-40B4-BE49-F238E27FC236}">
+                <a16:creationId xmlns:a16="http://schemas.microsoft.com/office/drawing/2014/main" id="{8BB9252B-3C5F-7816-D006-0A4ACA82EC59}"/>
+              </a:ext>
+            </a:extLst>
+          </p:cNvPr>
+          <p:cNvGraphicFramePr>
+            <a:graphicFrameLocks noGrp="1"/>
+          </p:cNvGraphicFramePr>
+          <p:nvPr>
+            <p:extLst>
+              <p:ext uri="{D42A27DB-BD31-4B8C-83A1-F6EECF244321}">
+                <p14:modId xmlns:p14="http://schemas.microsoft.com/office/powerpoint/2010/main" val="716820604"/>
+              </p:ext>
+            </p:extLst>
+          </p:nvPr>
+        </p:nvGraphicFramePr>
+        <p:xfrm>
+          <a:off x="1152150" y="3147872"/>
+          <a:ext cx="4898297" cy="558652"/>
+        </p:xfrm>
+        <a:graphic>
+          <a:graphicData uri="http://schemas.openxmlformats.org/drawingml/2006/table">
+            <a:tbl>
+              <a:tblPr firstRow="1" bandRow="1"/>
+              <a:tblGrid>
+                <a:gridCol w="1529841">
+                  <a:extLst>
+                    <a:ext uri="{9D8B030D-6E8A-4147-A177-3AD203B41FA5}">
+                      <a16:colId xmlns:a16="http://schemas.microsoft.com/office/drawing/2014/main" val="426783337"/>
+                    </a:ext>
+                  </a:extLst>
+                </a:gridCol>
+                <a:gridCol w="842114">
+                  <a:extLst>
+                    <a:ext uri="{9D8B030D-6E8A-4147-A177-3AD203B41FA5}">
+                      <a16:colId xmlns:a16="http://schemas.microsoft.com/office/drawing/2014/main" val="1092029791"/>
+                    </a:ext>
+                  </a:extLst>
+                </a:gridCol>
+                <a:gridCol w="842114">
+                  <a:extLst>
+                    <a:ext uri="{9D8B030D-6E8A-4147-A177-3AD203B41FA5}">
+                      <a16:colId xmlns:a16="http://schemas.microsoft.com/office/drawing/2014/main" val="2835768170"/>
+                    </a:ext>
+                  </a:extLst>
+                </a:gridCol>
+                <a:gridCol w="842114">
+                  <a:extLst>
+                    <a:ext uri="{9D8B030D-6E8A-4147-A177-3AD203B41FA5}">
+                      <a16:colId xmlns:a16="http://schemas.microsoft.com/office/drawing/2014/main" val="2946066054"/>
+                    </a:ext>
+                  </a:extLst>
+                </a:gridCol>
+                <a:gridCol w="842114">
+                  <a:extLst>
+                    <a:ext uri="{9D8B030D-6E8A-4147-A177-3AD203B41FA5}">
+                      <a16:colId xmlns:a16="http://schemas.microsoft.com/office/drawing/2014/main" val="2045902365"/>
+                    </a:ext>
+                  </a:extLst>
+                </a:gridCol>
+              </a:tblGrid>
+              <a:tr h="312188">
+                <a:tc>
+                  <a:txBody>
+                    <a:bodyPr/>
+                    <a:lstStyle/>
+                    <a:p>
+                      <a:pPr algn="ctr" rtl="0" fontAlgn="ctr"/>
+                      <a:r>
+                        <a:rPr lang="fr-FR" sz="800" b="0" i="0" u="none" strike="noStrike" dirty="0">
+                          <a:solidFill>
+                            <a:srgbClr val="04202E"/>
+                          </a:solidFill>
+                          <a:effectLst/>
+                          <a:latin typeface="Proxima Nova Rg" panose="02000506030000020004" pitchFamily="2" charset="0"/>
+                        </a:rPr>
+                        <a:t>Performances au &lt;DDR&gt; (&lt;DIVIDENDE&gt;)</a:t>
+                      </a:r>
+                    </a:p>
+                  </a:txBody>
+                  <a:tcPr marL="9525" marR="9525" marT="9525" marB="0" anchor="ctr">
+                    <a:lnL>
+                      <a:noFill/>
+                    </a:lnL>
+                    <a:lnR>
+                      <a:noFill/>
+                    </a:lnR>
+                    <a:lnT w="12700" cap="flat" cmpd="sng" algn="ctr">
+                      <a:solidFill>
+                        <a:srgbClr val="B9A049"/>
+                      </a:solidFill>
+                      <a:prstDash val="solid"/>
+                      <a:round/>
+                      <a:headEnd type="none" w="med" len="med"/>
+                      <a:tailEnd type="none" w="med" len="med"/>
+                    </a:lnT>
+                    <a:lnB w="12700" cap="flat" cmpd="sng" algn="ctr">
+                      <a:solidFill>
+                        <a:srgbClr val="B9A049"/>
+                      </a:solidFill>
+                      <a:prstDash val="solid"/>
+                      <a:round/>
+                      <a:headEnd type="none" w="med" len="med"/>
+                      <a:tailEnd type="none" w="med" len="med"/>
+                    </a:lnB>
+                  </a:tcPr>
+                </a:tc>
+                <a:tc>
+                  <a:txBody>
+                    <a:bodyPr/>
+                    <a:lstStyle/>
+                    <a:p>
+                      <a:pPr algn="ctr" rtl="0" fontAlgn="ctr"/>
+                      <a:r>
+                        <a:rPr lang="fr-FR" sz="800" b="1" i="0" u="none" strike="noStrike" dirty="0">
+                          <a:solidFill>
+                            <a:srgbClr val="04202E"/>
+                          </a:solidFill>
+                          <a:effectLst/>
+                          <a:latin typeface="Proxima Nova Rg" panose="02000506030000020004" pitchFamily="2" charset="0"/>
+                        </a:rPr>
+                        <a:t>1 an</a:t>
+                      </a:r>
+                    </a:p>
+                  </a:txBody>
+                  <a:tcPr marL="9525" marR="9525" marT="9525" marB="0" anchor="ctr">
+                    <a:lnL>
+                      <a:noFill/>
+                    </a:lnL>
+                    <a:lnR>
+                      <a:noFill/>
+                    </a:lnR>
+                    <a:lnT w="12700" cap="flat" cmpd="sng" algn="ctr">
+                      <a:solidFill>
+                        <a:srgbClr val="B9A049"/>
+                      </a:solidFill>
+                      <a:prstDash val="solid"/>
+                      <a:round/>
+                      <a:headEnd type="none" w="med" len="med"/>
+                      <a:tailEnd type="none" w="med" len="med"/>
+                    </a:lnT>
+                    <a:lnB w="12700" cap="flat" cmpd="sng" algn="ctr">
+                      <a:solidFill>
+                        <a:srgbClr val="B9A049"/>
+                      </a:solidFill>
+                      <a:prstDash val="solid"/>
+                      <a:round/>
+                      <a:headEnd type="none" w="med" len="med"/>
+                      <a:tailEnd type="none" w="med" len="med"/>
+                    </a:lnB>
+                  </a:tcPr>
+                </a:tc>
+                <a:tc>
+                  <a:txBody>
+                    <a:bodyPr/>
+                    <a:lstStyle/>
+                    <a:p>
+                      <a:pPr algn="ctr" rtl="0" fontAlgn="ctr"/>
+                      <a:r>
+                        <a:rPr lang="fr-FR" sz="800" b="1" i="0" u="none" strike="noStrike" dirty="0">
+                          <a:solidFill>
+                            <a:srgbClr val="04202E"/>
+                          </a:solidFill>
+                          <a:effectLst/>
+                          <a:latin typeface="Proxima Nova Rg" panose="02000506030000020004" pitchFamily="2" charset="0"/>
+                        </a:rPr>
+                        <a:t>3 ans </a:t>
+                      </a:r>
+                    </a:p>
+                  </a:txBody>
+                  <a:tcPr marL="9525" marR="9525" marT="9525" marB="0" anchor="ctr">
+                    <a:lnL>
+                      <a:noFill/>
+                    </a:lnL>
+                    <a:lnR>
+                      <a:noFill/>
+                    </a:lnR>
+                    <a:lnT w="12700" cap="flat" cmpd="sng" algn="ctr">
+                      <a:solidFill>
+                        <a:srgbClr val="B9A049"/>
+                      </a:solidFill>
+                      <a:prstDash val="solid"/>
+                      <a:round/>
+                      <a:headEnd type="none" w="med" len="med"/>
+                      <a:tailEnd type="none" w="med" len="med"/>
+                    </a:lnT>
+                    <a:lnB w="12700" cap="flat" cmpd="sng" algn="ctr">
+                      <a:solidFill>
+                        <a:srgbClr val="B9A049"/>
+                      </a:solidFill>
+                      <a:prstDash val="solid"/>
+                      <a:round/>
+                      <a:headEnd type="none" w="med" len="med"/>
+                      <a:tailEnd type="none" w="med" len="med"/>
+                    </a:lnB>
+                  </a:tcPr>
+                </a:tc>
+                <a:tc>
+                  <a:txBody>
+                    <a:bodyPr/>
+                    <a:lstStyle/>
+                    <a:p>
+                      <a:pPr algn="ctr" rtl="0" fontAlgn="ctr"/>
+                      <a:r>
+                        <a:rPr lang="fr-FR" sz="800" b="1" i="0" u="none" strike="noStrike" dirty="0">
+                          <a:solidFill>
+                            <a:srgbClr val="04202E"/>
+                          </a:solidFill>
+                          <a:effectLst/>
+                          <a:latin typeface="Proxima Nova Rg" panose="02000506030000020004" pitchFamily="2" charset="0"/>
+                        </a:rPr>
+                        <a:t>5 ans </a:t>
+                      </a:r>
+                    </a:p>
+                  </a:txBody>
+                  <a:tcPr marL="9525" marR="9525" marT="9525" marB="0" anchor="ctr">
+                    <a:lnL>
+                      <a:noFill/>
+                    </a:lnL>
+                    <a:lnR>
+                      <a:noFill/>
+                    </a:lnR>
+                    <a:lnT w="12700" cap="flat" cmpd="sng" algn="ctr">
+                      <a:solidFill>
+                        <a:srgbClr val="B9A049"/>
+                      </a:solidFill>
+                      <a:prstDash val="solid"/>
+                      <a:round/>
+                      <a:headEnd type="none" w="med" len="med"/>
+                      <a:tailEnd type="none" w="med" len="med"/>
+                    </a:lnT>
+                    <a:lnB w="12700" cap="flat" cmpd="sng" algn="ctr">
+                      <a:solidFill>
+                        <a:srgbClr val="B9A049"/>
+                      </a:solidFill>
+                      <a:prstDash val="solid"/>
+                      <a:round/>
+                      <a:headEnd type="none" w="med" len="med"/>
+                      <a:tailEnd type="none" w="med" len="med"/>
+                    </a:lnB>
+                  </a:tcPr>
+                </a:tc>
+                <a:tc>
+                  <a:txBody>
+                    <a:bodyPr/>
+                    <a:lstStyle/>
+                    <a:p>
+                      <a:pPr algn="ctr" rtl="0" fontAlgn="ctr"/>
+                      <a:r>
+                        <a:rPr lang="fr-FR" sz="800" b="1" i="0" u="none" strike="noStrike" dirty="0">
+                          <a:solidFill>
+                            <a:srgbClr val="04202E"/>
+                          </a:solidFill>
+                          <a:effectLst/>
+                          <a:latin typeface="Proxima Nova Rg" panose="02000506030000020004" pitchFamily="2" charset="0"/>
+                        </a:rPr>
+                        <a:t>7 ans</a:t>
+                      </a:r>
+                    </a:p>
+                  </a:txBody>
+                  <a:tcPr marL="9525" marR="9525" marT="9525" marB="0" anchor="ctr">
+                    <a:lnL>
+                      <a:noFill/>
+                    </a:lnL>
+                    <a:lnR>
+                      <a:noFill/>
+                    </a:lnR>
+                    <a:lnT w="12700" cap="flat" cmpd="sng" algn="ctr">
+                      <a:solidFill>
+                        <a:srgbClr val="B9A049"/>
+                      </a:solidFill>
+                      <a:prstDash val="solid"/>
+                      <a:round/>
+                      <a:headEnd type="none" w="med" len="med"/>
+                      <a:tailEnd type="none" w="med" len="med"/>
+                    </a:lnT>
+                    <a:lnB w="12700" cap="flat" cmpd="sng" algn="ctr">
+                      <a:solidFill>
+                        <a:srgbClr val="B9A049"/>
+                      </a:solidFill>
+                      <a:prstDash val="solid"/>
+                      <a:round/>
+                      <a:headEnd type="none" w="med" len="med"/>
+                      <a:tailEnd type="none" w="med" len="med"/>
+                    </a:lnB>
+                  </a:tcPr>
+                </a:tc>
+                <a:extLst>
+                  <a:ext uri="{0D108BD9-81ED-4DB2-BD59-A6C34878D82A}">
+                    <a16:rowId xmlns:a16="http://schemas.microsoft.com/office/drawing/2014/main" val="545727365"/>
+                  </a:ext>
+                </a:extLst>
+              </a:tr>
+              <a:tr h="246464">
+                <a:tc>
+                  <a:txBody>
+                    <a:bodyPr/>
+                    <a:lstStyle/>
+                    <a:p>
+                      <a:pPr marL="0" algn="ctr" defTabSz="755934" rtl="0" eaLnBrk="1" fontAlgn="ctr" latinLnBrk="0" hangingPunct="1"/>
+                      <a:r>
+                        <a:rPr lang="fr-FR" sz="800" b="0" i="0" u="none" strike="noStrike" kern="1200" dirty="0">
+                          <a:solidFill>
+                            <a:srgbClr val="004F74"/>
+                          </a:solidFill>
+                          <a:effectLst/>
+                          <a:latin typeface="Proxima Nova Rg" panose="02000506030000020004" pitchFamily="2" charset="0"/>
+                          <a:ea typeface="+mn-ea"/>
+                          <a:cs typeface="+mn-cs"/>
+                        </a:rPr>
+                        <a:t>&lt;NOMSOUSJACENT&gt;</a:t>
+                      </a:r>
+                    </a:p>
+                  </a:txBody>
+                  <a:tcPr marL="9525" marR="9525" marT="9525" marB="0" anchor="ctr">
+                    <a:lnL>
+                      <a:noFill/>
+                    </a:lnL>
+                    <a:lnR>
+                      <a:noFill/>
+                    </a:lnR>
+                    <a:lnT w="12700" cap="flat" cmpd="sng" algn="ctr">
+                      <a:solidFill>
+                        <a:srgbClr val="B9A049"/>
+                      </a:solidFill>
+                      <a:prstDash val="solid"/>
+                      <a:round/>
+                      <a:headEnd type="none" w="med" len="med"/>
+                      <a:tailEnd type="none" w="med" len="med"/>
+                    </a:lnT>
+                    <a:lnB w="12700" cap="flat" cmpd="sng" algn="ctr">
+                      <a:solidFill>
+                        <a:srgbClr val="B9A049"/>
+                      </a:solidFill>
+                      <a:prstDash val="solid"/>
+                      <a:round/>
+                      <a:headEnd type="none" w="med" len="med"/>
+                      <a:tailEnd type="none" w="med" len="med"/>
+                    </a:lnB>
+                  </a:tcPr>
+                </a:tc>
+                <a:tc>
+                  <a:txBody>
+                    <a:bodyPr/>
+                    <a:lstStyle/>
+                    <a:p>
+                      <a:pPr marL="0" algn="ctr" defTabSz="755934" rtl="0" eaLnBrk="1" fontAlgn="ctr" latinLnBrk="0" hangingPunct="1"/>
+                      <a:endParaRPr lang="fr-FR" sz="800" b="1" i="0" u="none" strike="noStrike" kern="1200" dirty="0">
+                        <a:solidFill>
+                          <a:srgbClr val="004F74"/>
+                        </a:solidFill>
+                        <a:effectLst/>
+                        <a:latin typeface="Proxima Nova Rg" panose="02000506030000020004" pitchFamily="2" charset="0"/>
+                        <a:ea typeface="+mn-ea"/>
+                        <a:cs typeface="+mn-cs"/>
+                      </a:endParaRPr>
+                    </a:p>
+                  </a:txBody>
+                  <a:tcPr marL="9525" marR="9525" marT="9525" marB="0" anchor="ctr">
+                    <a:lnL>
+                      <a:noFill/>
+                    </a:lnL>
+                    <a:lnR>
+                      <a:noFill/>
+                    </a:lnR>
+                    <a:lnT w="12700" cap="flat" cmpd="sng" algn="ctr">
+                      <a:solidFill>
+                        <a:srgbClr val="B9A049"/>
+                      </a:solidFill>
+                      <a:prstDash val="solid"/>
+                      <a:round/>
+                      <a:headEnd type="none" w="med" len="med"/>
+                      <a:tailEnd type="none" w="med" len="med"/>
+                    </a:lnT>
+                    <a:lnB w="12700" cap="flat" cmpd="sng" algn="ctr">
+                      <a:solidFill>
+                        <a:srgbClr val="B9A049"/>
+                      </a:solidFill>
+                      <a:prstDash val="solid"/>
+                      <a:round/>
+                      <a:headEnd type="none" w="med" len="med"/>
+                      <a:tailEnd type="none" w="med" len="med"/>
+                    </a:lnB>
+                  </a:tcPr>
+                </a:tc>
+                <a:tc>
+                  <a:txBody>
+                    <a:bodyPr/>
+                    <a:lstStyle/>
+                    <a:p>
+                      <a:pPr marL="0" algn="ctr" defTabSz="755934" rtl="0" eaLnBrk="1" fontAlgn="ctr" latinLnBrk="0" hangingPunct="1"/>
+                      <a:endParaRPr lang="fr-FR" sz="800" b="1" i="0" u="none" strike="noStrike" kern="1200" dirty="0">
+                        <a:solidFill>
+                          <a:srgbClr val="004F74"/>
+                        </a:solidFill>
+                        <a:effectLst/>
+                        <a:latin typeface="Proxima Nova Rg" panose="02000506030000020004" pitchFamily="2" charset="0"/>
+                        <a:ea typeface="+mn-ea"/>
+                        <a:cs typeface="+mn-cs"/>
+                      </a:endParaRPr>
+                    </a:p>
+                  </a:txBody>
+                  <a:tcPr marL="9525" marR="9525" marT="9525" marB="0" anchor="ctr">
+                    <a:lnL>
+                      <a:noFill/>
+                    </a:lnL>
+                    <a:lnR>
+                      <a:noFill/>
+                    </a:lnR>
+                    <a:lnT w="12700" cap="flat" cmpd="sng" algn="ctr">
+                      <a:solidFill>
+                        <a:srgbClr val="B9A049"/>
+                      </a:solidFill>
+                      <a:prstDash val="solid"/>
+                      <a:round/>
+                      <a:headEnd type="none" w="med" len="med"/>
+                      <a:tailEnd type="none" w="med" len="med"/>
+                    </a:lnT>
+                    <a:lnB w="12700" cap="flat" cmpd="sng" algn="ctr">
+                      <a:solidFill>
+                        <a:srgbClr val="B9A049"/>
+                      </a:solidFill>
+                      <a:prstDash val="solid"/>
+                      <a:round/>
+                      <a:headEnd type="none" w="med" len="med"/>
+                      <a:tailEnd type="none" w="med" len="med"/>
+                    </a:lnB>
+                  </a:tcPr>
+                </a:tc>
+                <a:tc>
+                  <a:txBody>
+                    <a:bodyPr/>
+                    <a:lstStyle/>
+                    <a:p>
+                      <a:pPr marL="0" algn="ctr" defTabSz="755934" rtl="0" eaLnBrk="1" fontAlgn="ctr" latinLnBrk="0" hangingPunct="1"/>
+                      <a:endParaRPr lang="fr-FR" sz="800" b="1" i="0" u="none" strike="noStrike" kern="1200" dirty="0">
+                        <a:solidFill>
+                          <a:srgbClr val="004F74"/>
+                        </a:solidFill>
+                        <a:effectLst/>
+                        <a:latin typeface="Proxima Nova Rg" panose="02000506030000020004" pitchFamily="2" charset="0"/>
+                        <a:ea typeface="+mn-ea"/>
+                        <a:cs typeface="+mn-cs"/>
+                      </a:endParaRPr>
+                    </a:p>
+                  </a:txBody>
+                  <a:tcPr marL="9525" marR="9525" marT="9525" marB="0" anchor="ctr">
+                    <a:lnL>
+                      <a:noFill/>
+                    </a:lnL>
+                    <a:lnR>
+                      <a:noFill/>
+                    </a:lnR>
+                    <a:lnT w="12700" cap="flat" cmpd="sng" algn="ctr">
+                      <a:solidFill>
+                        <a:srgbClr val="B9A049"/>
+                      </a:solidFill>
+                      <a:prstDash val="solid"/>
+                      <a:round/>
+                      <a:headEnd type="none" w="med" len="med"/>
+                      <a:tailEnd type="none" w="med" len="med"/>
+                    </a:lnT>
+                    <a:lnB w="12700" cap="flat" cmpd="sng" algn="ctr">
+                      <a:solidFill>
+                        <a:srgbClr val="B9A049"/>
+                      </a:solidFill>
+                      <a:prstDash val="solid"/>
+                      <a:round/>
+                      <a:headEnd type="none" w="med" len="med"/>
+                      <a:tailEnd type="none" w="med" len="med"/>
+                    </a:lnB>
+                  </a:tcPr>
+                </a:tc>
+                <a:tc>
+                  <a:txBody>
+                    <a:bodyPr/>
+                    <a:lstStyle/>
+                    <a:p>
+                      <a:pPr marL="0" algn="ctr" defTabSz="755934" rtl="0" eaLnBrk="1" fontAlgn="ctr" latinLnBrk="0" hangingPunct="1"/>
+                      <a:endParaRPr lang="fr-FR" sz="800" b="1" i="0" u="none" strike="noStrike" kern="1200" dirty="0">
+                        <a:solidFill>
+                          <a:srgbClr val="004F74"/>
+                        </a:solidFill>
+                        <a:effectLst/>
+                        <a:latin typeface="Proxima Nova Rg" panose="02000506030000020004" pitchFamily="2" charset="0"/>
+                        <a:ea typeface="+mn-ea"/>
+                        <a:cs typeface="+mn-cs"/>
+                      </a:endParaRPr>
+                    </a:p>
+                  </a:txBody>
+                  <a:tcPr marL="9525" marR="9525" marT="9525" marB="0" anchor="ctr">
+                    <a:lnL>
+                      <a:noFill/>
+                    </a:lnL>
+                    <a:lnR>
+                      <a:noFill/>
+                    </a:lnR>
+                    <a:lnT w="12700" cap="flat" cmpd="sng" algn="ctr">
+                      <a:solidFill>
+                        <a:srgbClr val="B9A049"/>
+                      </a:solidFill>
+                      <a:prstDash val="solid"/>
+                      <a:round/>
+                      <a:headEnd type="none" w="med" len="med"/>
+                      <a:tailEnd type="none" w="med" len="med"/>
+                    </a:lnT>
+                    <a:lnB w="12700" cap="flat" cmpd="sng" algn="ctr">
+                      <a:solidFill>
+                        <a:srgbClr val="B9A049"/>
+                      </a:solidFill>
+                      <a:prstDash val="solid"/>
+                      <a:round/>
+                      <a:headEnd type="none" w="med" len="med"/>
+                      <a:tailEnd type="none" w="med" len="med"/>
+                    </a:lnB>
+                  </a:tcPr>
+                </a:tc>
+                <a:extLst>
+                  <a:ext uri="{0D108BD9-81ED-4DB2-BD59-A6C34878D82A}">
+                    <a16:rowId xmlns:a16="http://schemas.microsoft.com/office/drawing/2014/main" val="3345566369"/>
+                  </a:ext>
+                </a:extLst>
+              </a:tr>
+            </a:tbl>
+          </a:graphicData>
+        </a:graphic>
+      </p:graphicFrame>
     </p:spTree>
     <p:extLst>
       <p:ext uri="{BB962C8B-B14F-4D97-AF65-F5344CB8AC3E}">

</xml_diff>

<commit_message>
PTN J AI OUBLIE DE PUSH
</commit_message>
<xml_diff>
--- a/Templates/testmercredi.pptx
+++ b/Templates/testmercredi.pptx
@@ -403,7 +403,7 @@
           <a:p>
             <a:fld id="{515CCE07-1711-4DC7-A7D8-7ED312C82FB8}" type="datetimeFigureOut">
               <a:rPr lang="fr-FR" smtClean="0"/>
-              <a:t>09/05/2022</a:t>
+              <a:t>13/05/2022</a:t>
             </a:fld>
             <a:endParaRPr lang="fr-FR"/>
           </a:p>
@@ -568,7 +568,7 @@
           <a:p>
             <a:fld id="{014ABEAC-8B63-4BD1-9569-A14EB8752A94}" type="datetimeFigureOut">
               <a:rPr lang="fr-FR" smtClean="0"/>
-              <a:t>09/05/2022</a:t>
+              <a:t>13/05/2022</a:t>
             </a:fld>
             <a:endParaRPr lang="fr-FR"/>
           </a:p>
@@ -2081,15 +2081,7 @@
             </a:r>
             <a:r>
               <a:rPr lang="fr-FR" sz="800" b="1" cap="none" dirty="0"/>
-              <a:t>de droit &lt;droit&gt; présentant un risque de perte en capital partielle ou totale </a:t>
-            </a:r>
-            <a:r>
-              <a:rPr lang="fr-FR" sz="800" b="1" cap="none"/>
-              <a:t>en cours de </a:t>
-            </a:r>
-            <a:r>
-              <a:rPr lang="fr-FR" sz="800" b="1" cap="none" dirty="0"/>
-              <a:t>vie</a:t>
+              <a:t>de droit &lt;droit&gt; présentant un risque de perte en capital partielle ou totale en cours de vie</a:t>
             </a:r>
             <a:r>
               <a:rPr lang="fr-FR" sz="800" b="1" cap="none" baseline="30000" dirty="0"/>
@@ -2219,10 +2211,6 @@
                   <a:schemeClr val="tx2"/>
                 </a:solidFill>
               </a:rPr>
-              <a:t>.</a:t>
-            </a:r>
-            <a:r>
-              <a:rPr lang="fr-FR" sz="800" i="1" cap="none" dirty="0"/>
               <a:t>.</a:t>
             </a:r>
             <a:endParaRPr lang="fr-FR" sz="800" cap="none" dirty="0"/>
@@ -4994,7 +4982,7 @@
         </p:nvSpPr>
         <p:spPr>
           <a:xfrm>
-            <a:off x="361950" y="4428514"/>
+            <a:off x="361950" y="4192294"/>
             <a:ext cx="45719" cy="138398"/>
           </a:xfrm>
           <a:prstGeom prst="rect">
@@ -5044,52 +5032,59 @@
           <p:nvPr>
             <p:extLst>
               <p:ext uri="{D42A27DB-BD31-4B8C-83A1-F6EECF244321}">
-                <p14:modId xmlns:p14="http://schemas.microsoft.com/office/powerpoint/2010/main" val="3254370239"/>
+                <p14:modId xmlns:p14="http://schemas.microsoft.com/office/powerpoint/2010/main" val="2188875007"/>
               </p:ext>
             </p:extLst>
           </p:nvPr>
         </p:nvGraphicFramePr>
         <p:xfrm>
-          <a:off x="1482862" y="8326240"/>
-          <a:ext cx="4898297" cy="558652"/>
+          <a:off x="499188" y="8288140"/>
+          <a:ext cx="6343573" cy="558652"/>
         </p:xfrm>
         <a:graphic>
           <a:graphicData uri="http://schemas.openxmlformats.org/drawingml/2006/table">
             <a:tbl>
               <a:tblPr firstRow="1" bandRow="1"/>
               <a:tblGrid>
-                <a:gridCol w="1529841">
+                <a:gridCol w="2304972">
                   <a:extLst>
                     <a:ext uri="{9D8B030D-6E8A-4147-A177-3AD203B41FA5}">
                       <a16:colId xmlns:a16="http://schemas.microsoft.com/office/drawing/2014/main" val="426783337"/>
                     </a:ext>
                   </a:extLst>
                 </a:gridCol>
-                <a:gridCol w="842114">
+                <a:gridCol w="701040">
                   <a:extLst>
                     <a:ext uri="{9D8B030D-6E8A-4147-A177-3AD203B41FA5}">
                       <a16:colId xmlns:a16="http://schemas.microsoft.com/office/drawing/2014/main" val="1092029791"/>
                     </a:ext>
                   </a:extLst>
                 </a:gridCol>
-                <a:gridCol w="842114">
+                <a:gridCol w="772160">
                   <a:extLst>
                     <a:ext uri="{9D8B030D-6E8A-4147-A177-3AD203B41FA5}">
                       <a16:colId xmlns:a16="http://schemas.microsoft.com/office/drawing/2014/main" val="2835768170"/>
                     </a:ext>
                   </a:extLst>
                 </a:gridCol>
-                <a:gridCol w="842114">
+                <a:gridCol w="889000">
                   <a:extLst>
                     <a:ext uri="{9D8B030D-6E8A-4147-A177-3AD203B41FA5}">
                       <a16:colId xmlns:a16="http://schemas.microsoft.com/office/drawing/2014/main" val="2946066054"/>
                     </a:ext>
                   </a:extLst>
                 </a:gridCol>
-                <a:gridCol w="842114">
+                <a:gridCol w="807720">
                   <a:extLst>
                     <a:ext uri="{9D8B030D-6E8A-4147-A177-3AD203B41FA5}">
                       <a16:colId xmlns:a16="http://schemas.microsoft.com/office/drawing/2014/main" val="2045902365"/>
+                    </a:ext>
+                  </a:extLst>
+                </a:gridCol>
+                <a:gridCol w="868681">
+                  <a:extLst>
+                    <a:ext uri="{9D8B030D-6E8A-4147-A177-3AD203B41FA5}">
+                      <a16:colId xmlns:a16="http://schemas.microsoft.com/office/drawing/2014/main" val="4159666098"/>
                     </a:ext>
                   </a:extLst>
                 </a:gridCol>
@@ -5100,16 +5095,10 @@
                     <a:bodyPr/>
                     <a:lstStyle/>
                     <a:p>
-                      <a:pPr algn="ctr" rtl="0" fontAlgn="ctr"/>
+                      <a:pPr algn="l" rtl="0" fontAlgn="ctr"/>
                       <a:r>
-                        <a:rPr lang="fr-FR" sz="800" b="1" i="0" u="none" strike="noStrike" dirty="0">
-                          <a:solidFill>
-                            <a:srgbClr val="04202E"/>
-                          </a:solidFill>
-                          <a:effectLst/>
-                          <a:latin typeface="Proxima Nova Rg" panose="02000506030000020004" pitchFamily="2" charset="0"/>
-                        </a:rPr>
-                        <a:t>Performances au &lt;DDR&gt; (&lt;DIVIDENDE&gt;)</a:t>
+                        <a:rPr lang="fr-FR" sz="800" dirty="0"/>
+                        <a:t>Performances au &lt;DDR&gt;</a:t>
                       </a:r>
                     </a:p>
                   </a:txBody>
@@ -5145,9 +5134,9 @@
                     <a:bodyPr/>
                     <a:lstStyle/>
                     <a:p>
-                      <a:pPr algn="ctr" rtl="0" fontAlgn="ctr"/>
+                      <a:pPr algn="l" rtl="0" fontAlgn="ctr"/>
                       <a:r>
-                        <a:rPr lang="fr-FR" sz="800" b="1" i="0" u="none" strike="noStrike">
+                        <a:rPr lang="fr-FR" sz="800" b="1" i="0" u="none" strike="noStrike" dirty="0">
                           <a:solidFill>
                             <a:srgbClr val="04202E"/>
                           </a:solidFill>
@@ -5190,7 +5179,7 @@
                     <a:bodyPr/>
                     <a:lstStyle/>
                     <a:p>
-                      <a:pPr algn="ctr" rtl="0" fontAlgn="ctr"/>
+                      <a:pPr algn="l" rtl="0" fontAlgn="ctr"/>
                       <a:r>
                         <a:rPr lang="fr-FR" sz="800" b="1" i="0" u="none" strike="noStrike" dirty="0">
                           <a:solidFill>
@@ -5235,7 +5224,7 @@
                     <a:bodyPr/>
                     <a:lstStyle/>
                     <a:p>
-                      <a:pPr algn="ctr" rtl="0" fontAlgn="ctr"/>
+                      <a:pPr algn="l" rtl="0" fontAlgn="ctr"/>
                       <a:r>
                         <a:rPr lang="fr-FR" sz="800" b="1" i="0" u="none" strike="noStrike" dirty="0">
                           <a:solidFill>
@@ -5280,7 +5269,7 @@
                     <a:bodyPr/>
                     <a:lstStyle/>
                     <a:p>
-                      <a:pPr algn="ctr" rtl="0" fontAlgn="ctr"/>
+                      <a:pPr algn="l" rtl="0" fontAlgn="ctr"/>
                       <a:r>
                         <a:rPr lang="fr-FR" sz="800" b="1" i="0" u="none" strike="noStrike" dirty="0">
                           <a:solidFill>
@@ -5289,7 +5278,52 @@
                           <a:effectLst/>
                           <a:latin typeface="Proxima Nova Rg" panose="02000506030000020004" pitchFamily="2" charset="0"/>
                         </a:rPr>
-                        <a:t>7 ans</a:t>
+                        <a:t>8 ans</a:t>
+                      </a:r>
+                    </a:p>
+                  </a:txBody>
+                  <a:tcPr marL="9525" marR="9525" marT="9525" marB="0" anchor="ctr">
+                    <a:lnL>
+                      <a:noFill/>
+                    </a:lnL>
+                    <a:lnR>
+                      <a:noFill/>
+                    </a:lnR>
+                    <a:lnT w="12700" cap="flat" cmpd="sng" algn="ctr">
+                      <a:solidFill>
+                        <a:srgbClr val="B9A049"/>
+                      </a:solidFill>
+                      <a:prstDash val="solid"/>
+                      <a:round/>
+                      <a:headEnd type="none" w="med" len="med"/>
+                      <a:tailEnd type="none" w="med" len="med"/>
+                    </a:lnT>
+                    <a:lnB w="12700" cap="flat" cmpd="sng" algn="ctr">
+                      <a:solidFill>
+                        <a:srgbClr val="B9A049"/>
+                      </a:solidFill>
+                      <a:prstDash val="solid"/>
+                      <a:round/>
+                      <a:headEnd type="none" w="med" len="med"/>
+                      <a:tailEnd type="none" w="med" len="med"/>
+                    </a:lnB>
+                  </a:tcPr>
+                </a:tc>
+                <a:tc>
+                  <a:txBody>
+                    <a:bodyPr/>
+                    <a:lstStyle/>
+                    <a:p>
+                      <a:pPr algn="l" rtl="0" fontAlgn="ctr"/>
+                      <a:r>
+                        <a:rPr lang="fr-FR" sz="800" b="1" i="0" u="none" strike="noStrike" dirty="0">
+                          <a:solidFill>
+                            <a:srgbClr val="04202E"/>
+                          </a:solidFill>
+                          <a:effectLst/>
+                          <a:latin typeface="Proxima Nova Rg" panose="02000506030000020004" pitchFamily="2" charset="0"/>
+                        </a:rPr>
+                        <a:t>12 ans</a:t>
                       </a:r>
                     </a:p>
                   </a:txBody>
@@ -5333,18 +5367,59 @@
                     <a:lstStyle/>
                     <a:p>
                       <a:pPr marL="0" algn="ctr" defTabSz="755934" rtl="0" eaLnBrk="1" fontAlgn="ctr" latinLnBrk="0" hangingPunct="1"/>
-                      <a:r>
-                        <a:rPr lang="fr-FR" sz="800" b="1" i="0" u="none" strike="noStrike" kern="1200" dirty="0">
-                          <a:solidFill>
-                            <a:srgbClr val="004F74"/>
-                          </a:solidFill>
-                          <a:effectLst/>
-                          <a:latin typeface="Proxima Nova Rg" panose="02000506030000020004" pitchFamily="2" charset="0"/>
-                          <a:ea typeface="+mn-ea"/>
-                          <a:cs typeface="+mn-cs"/>
-                        </a:rPr>
-                        <a:t>&lt;NOMSOUSJACENT&gt;</a:t>
-                      </a:r>
+                      <a:endParaRPr lang="fr-FR" sz="800" b="1" i="0" u="none" strike="noStrike" kern="1200" dirty="0">
+                        <a:solidFill>
+                          <a:srgbClr val="004F74"/>
+                        </a:solidFill>
+                        <a:effectLst/>
+                        <a:latin typeface="Proxima Nova Rg" panose="02000506030000020004" pitchFamily="2" charset="0"/>
+                        <a:ea typeface="+mn-ea"/>
+                        <a:cs typeface="+mn-cs"/>
+                      </a:endParaRPr>
+                    </a:p>
+                  </a:txBody>
+                  <a:tcPr marL="9525" marR="9525" marT="9525" marB="0" anchor="ctr">
+                    <a:lnL>
+                      <a:noFill/>
+                    </a:lnL>
+                    <a:lnR>
+                      <a:noFill/>
+                    </a:lnR>
+                    <a:lnT w="12700" cap="flat" cmpd="sng" algn="ctr">
+                      <a:solidFill>
+                        <a:srgbClr val="B9A049"/>
+                      </a:solidFill>
+                      <a:prstDash val="solid"/>
+                      <a:round/>
+                      <a:headEnd type="none" w="med" len="med"/>
+                      <a:tailEnd type="none" w="med" len="med"/>
+                    </a:lnT>
+                    <a:lnB w="12700" cap="flat" cmpd="sng" algn="ctr">
+                      <a:solidFill>
+                        <a:srgbClr val="B9A049"/>
+                      </a:solidFill>
+                      <a:prstDash val="solid"/>
+                      <a:round/>
+                      <a:headEnd type="none" w="med" len="med"/>
+                      <a:tailEnd type="none" w="med" len="med"/>
+                    </a:lnB>
+                  </a:tcPr>
+                </a:tc>
+                <a:tc>
+                  <a:txBody>
+                    <a:bodyPr/>
+                    <a:lstStyle/>
+                    <a:p>
+                      <a:pPr marL="0" algn="ctr" defTabSz="755934" rtl="0" eaLnBrk="1" fontAlgn="ctr" latinLnBrk="0" hangingPunct="1"/>
+                      <a:endParaRPr lang="fr-FR" sz="800" b="1" i="0" u="none" strike="noStrike" kern="1200" dirty="0">
+                        <a:solidFill>
+                          <a:srgbClr val="004F74"/>
+                        </a:solidFill>
+                        <a:effectLst/>
+                        <a:latin typeface="Proxima Nova Rg" panose="02000506030000020004" pitchFamily="2" charset="0"/>
+                        <a:ea typeface="+mn-ea"/>
+                        <a:cs typeface="+mn-cs"/>
+                      </a:endParaRPr>
                     </a:p>
                   </a:txBody>
                   <a:tcPr marL="9525" marR="9525" marT="9525" marB="0" anchor="ctr">
@@ -5590,7 +5665,7 @@
           <a:p>
             <a:pPr lvl="1" algn="just"/>
             <a:r>
-              <a:rPr lang="fr-FR" sz="700" i="1">
+              <a:rPr lang="fr-FR" sz="700" i="1" dirty="0">
                 <a:solidFill>
                   <a:schemeClr val="tx2"/>
                 </a:solidFill>
@@ -5850,7 +5925,7 @@
         </p:nvSpPr>
         <p:spPr>
           <a:xfrm>
-            <a:off x="458462" y="4382561"/>
+            <a:off x="458462" y="4132815"/>
             <a:ext cx="7248779" cy="276999"/>
           </a:xfrm>
           <a:prstGeom prst="rect">
@@ -6273,14 +6348,14 @@
           <p:nvPr>
             <p:extLst>
               <p:ext uri="{D42A27DB-BD31-4B8C-83A1-F6EECF244321}">
-                <p14:modId xmlns:p14="http://schemas.microsoft.com/office/powerpoint/2010/main" val="1982990457"/>
+                <p14:modId xmlns:p14="http://schemas.microsoft.com/office/powerpoint/2010/main" val="992867487"/>
               </p:ext>
             </p:extLst>
           </p:nvPr>
         </p:nvGraphicFramePr>
         <p:xfrm>
           <a:off x="361950" y="979297"/>
-          <a:ext cx="6837886" cy="7496715"/>
+          <a:ext cx="6837886" cy="7610507"/>
         </p:xfrm>
         <a:graphic>
           <a:graphicData uri="http://schemas.openxmlformats.org/drawingml/2006/table">
@@ -6304,7 +6379,7 @@
                   </a:extLst>
                 </a:gridCol>
               </a:tblGrid>
-              <a:tr h="268891">
+              <a:tr h="0">
                 <a:tc>
                   <a:txBody>
                     <a:bodyPr/>
@@ -6340,7 +6415,7 @@
                       </a:r>
                     </a:p>
                   </a:txBody>
-                  <a:tcPr marL="72000" marR="72000" marT="46800" marB="46800" anchor="ctr">
+                  <a:tcPr marL="72000" marR="72000" marT="46800" marB="46800" anchor="ctr" horzOverflow="overflow">
                     <a:lnL w="12700" cap="flat" cmpd="sng" algn="ctr">
                       <a:solidFill>
                         <a:schemeClr val="bg1">
@@ -6363,9 +6438,7 @@
                     </a:lnR>
                     <a:lnT w="12700" cap="flat" cmpd="sng" algn="ctr">
                       <a:solidFill>
-                        <a:schemeClr val="bg1">
-                          <a:lumMod val="85000"/>
-                        </a:schemeClr>
+                        <a:schemeClr val="bg1"/>
                       </a:solidFill>
                       <a:prstDash val="solid"/>
                       <a:round/>
@@ -6401,10 +6474,22 @@
                     <a:bodyPr/>
                     <a:lstStyle/>
                     <a:p>
-                      <a:pPr algn="just">
+                      <a:pPr marL="0" marR="0" lvl="0" indent="0" algn="just" defTabSz="1042988" rtl="0" eaLnBrk="1" fontAlgn="base" latinLnBrk="0" hangingPunct="1">
                         <a:lnSpc>
-                          <a:spcPct val="90000"/>
+                          <a:spcPct val="100000"/>
                         </a:lnSpc>
+                        <a:spcBef>
+                          <a:spcPct val="0"/>
+                        </a:spcBef>
+                        <a:spcAft>
+                          <a:spcPct val="0"/>
+                        </a:spcAft>
+                        <a:buClrTx/>
+                        <a:buSzTx/>
+                        <a:buFontTx/>
+                        <a:buNone/>
+                        <a:tabLst/>
+                        <a:defRPr/>
                       </a:pPr>
                       <a:r>
                         <a:rPr lang="fr-FR" sz="700" b="1" i="0" dirty="0">
@@ -6493,8 +6578,41 @@
                         <a:t>produit présente un risque de perte en capital à hauteur de l’intégralité de la baisse enregistrée par &lt;SJR1&gt;.</a:t>
                       </a:r>
                     </a:p>
+                    <a:p>
+                      <a:pPr marL="0" marR="0" lvl="0" indent="0" algn="just" defTabSz="1042988" rtl="0" eaLnBrk="1" fontAlgn="base" latinLnBrk="0" hangingPunct="1">
+                        <a:lnSpc>
+                          <a:spcPct val="100000"/>
+                        </a:lnSpc>
+                        <a:spcBef>
+                          <a:spcPct val="0"/>
+                        </a:spcBef>
+                        <a:spcAft>
+                          <a:spcPct val="0"/>
+                        </a:spcAft>
+                        <a:buClrTx/>
+                        <a:buSzTx/>
+                        <a:buFontTx/>
+                        <a:buNone/>
+                        <a:tabLst/>
+                        <a:defRPr/>
+                      </a:pPr>
+                      <a:endParaRPr kumimoji="0" lang="fr-FR" sz="700" b="0" i="0" u="none" strike="noStrike" kern="1200" cap="none" spc="0" normalizeH="0" baseline="30000" noProof="0" dirty="0">
+                        <a:ln>
+                          <a:noFill/>
+                        </a:ln>
+                        <a:solidFill>
+                          <a:schemeClr val="tx1"/>
+                        </a:solidFill>
+                        <a:effectLst/>
+                        <a:uLnTx/>
+                        <a:uFillTx/>
+                        <a:latin typeface="+mn-lt"/>
+                        <a:ea typeface="+mn-ea"/>
+                        <a:cs typeface="+mn-cs"/>
+                      </a:endParaRPr>
+                    </a:p>
                   </a:txBody>
-                  <a:tcPr marL="36000" marR="36000" marT="46800" marB="46800" anchor="ctr">
+                  <a:tcPr marL="72000" marR="72000" marT="46800" marB="46800" anchor="ctr" horzOverflow="overflow">
                     <a:lnL w="12700" cap="flat" cmpd="sng" algn="ctr">
                       <a:solidFill>
                         <a:schemeClr val="bg1"/>
@@ -6550,7 +6668,7 @@
                 </a:tc>
                 <a:extLst>
                   <a:ext uri="{0D108BD9-81ED-4DB2-BD59-A6C34878D82A}">
-                    <a16:rowId xmlns:a16="http://schemas.microsoft.com/office/drawing/2014/main" val="3737194071"/>
+                    <a16:rowId xmlns:a16="http://schemas.microsoft.com/office/drawing/2014/main" val="3895480035"/>
                   </a:ext>
                 </a:extLst>
               </a:tr>
@@ -6578,7 +6696,7 @@
                         <a:defRPr/>
                       </a:pPr>
                       <a:r>
-                        <a:rPr lang="fr-FR" sz="700" b="1" kern="1200">
+                        <a:rPr lang="fr-FR" sz="700" b="1" kern="1200" dirty="0">
                           <a:solidFill>
                             <a:srgbClr val="B9A049"/>
                           </a:solidFill>
@@ -13620,7 +13738,7 @@
         <p:spPr>
           <a:xfrm>
             <a:off x="458462" y="974579"/>
-            <a:ext cx="6741374" cy="3830279"/>
+            <a:ext cx="6741374" cy="4043671"/>
           </a:xfrm>
           <a:prstGeom prst="rect">
             <a:avLst/>
@@ -14661,16 +14779,7 @@
                 <a:ea typeface="+mn-ea"/>
                 <a:cs typeface="+mn-cs"/>
               </a:rPr>
-              <a:t>n’enregistre pas de baisse de plus de &lt;PDIPERF&gt; par rapport à son &lt;NDR&gt;, l’investisseur accepte de limiter ses &lt;GC&gt;s en cas de forte hausse &lt;SJR7&gt; (Taux de Rendement Annuel net maximum de &lt;TRA.F</a:t>
-            </a:r>
-            <a:r>
-              <a:rPr lang="fr-FR" sz="800" dirty="0">
-                <a:solidFill>
-                  <a:schemeClr val="tx1"/>
-                </a:solidFill>
-                <a:latin typeface="Proxima Nova Rg"/>
-              </a:rPr>
-              <a:t>.</a:t>
+              <a:t>n’enregistre pas de baisse de plus de &lt;PDIPERF&gt; par rapport à son &lt;NDR&gt;, l’investisseur accepte de limiter ses &lt;GC&gt;s en cas de forte hausse &lt;SJR7&gt; (Taux de Rendement Annuel net maximum de </a:t>
             </a:r>
             <a:r>
               <a:rPr kumimoji="0" lang="fr-FR" sz="800" b="0" i="0" u="none" strike="noStrike" kern="1200" cap="none" spc="0" normalizeH="0" baseline="0" noProof="0" dirty="0">
@@ -14681,13 +14790,16 @@
                   <a:schemeClr val="tx1"/>
                 </a:solidFill>
                 <a:effectLst/>
+                <a:highlight>
+                  <a:srgbClr val="FFFF00"/>
+                </a:highlight>
                 <a:uLnTx/>
                 <a:uFillTx/>
                 <a:latin typeface="Proxima Nova Rg"/>
                 <a:ea typeface="+mn-ea"/>
                 <a:cs typeface="+mn-cs"/>
               </a:rPr>
-              <a:t>A&gt;</a:t>
+              <a:t>&lt;TRA.F.A&gt; </a:t>
             </a:r>
             <a:r>
               <a:rPr kumimoji="0" lang="fr-FR" sz="800" b="0" i="0" u="none" strike="noStrike" kern="1200" cap="none" spc="0" normalizeH="0" baseline="30000" noProof="0" dirty="0">
@@ -14704,7 +14816,7 @@
                 <a:ea typeface="+mn-ea"/>
                 <a:cs typeface="+mn-cs"/>
               </a:rPr>
-              <a:t>(2)</a:t>
+              <a:t>( 2)</a:t>
             </a:r>
             <a:r>
               <a:rPr kumimoji="0" lang="fr-FR" sz="800" b="0" i="0" u="none" strike="noStrike" kern="1200" cap="none" spc="0" normalizeH="0" baseline="0" noProof="0" dirty="0">
@@ -14721,8 +14833,33 @@
                 <a:ea typeface="+mn-ea"/>
                 <a:cs typeface="+mn-cs"/>
               </a:rPr>
-              <a:t>).</a:t>
-            </a:r>
+              <a:t>.</a:t>
+            </a:r>
+          </a:p>
+          <a:p>
+            <a:pPr marL="0" marR="0" lvl="1" indent="0" algn="just" defTabSz="755934" rtl="0" eaLnBrk="1" fontAlgn="auto" latinLnBrk="0" hangingPunct="1">
+              <a:lnSpc>
+                <a:spcPct val="90000"/>
+              </a:lnSpc>
+              <a:spcBef>
+                <a:spcPts val="600"/>
+              </a:spcBef>
+              <a:spcAft>
+                <a:spcPts val="200"/>
+              </a:spcAft>
+              <a:buClrTx/>
+              <a:buSzTx/>
+              <a:buFont typeface="Arial" panose="020B0604020202020204" pitchFamily="34" charset="0"/>
+              <a:buNone/>
+              <a:tabLst/>
+              <a:defRPr/>
+            </a:pPr>
+            <a:endParaRPr lang="fr-FR" sz="800" noProof="0" dirty="0">
+              <a:solidFill>
+                <a:schemeClr val="tx1"/>
+              </a:solidFill>
+              <a:latin typeface="Proxima Nova Rg"/>
+            </a:endParaRPr>
           </a:p>
           <a:p>
             <a:pPr marL="0" marR="0" lvl="1" indent="0" algn="just" defTabSz="755934" rtl="0" eaLnBrk="1" fontAlgn="auto" latinLnBrk="0" hangingPunct="1">
@@ -29354,11 +29491,12 @@
 </file>
 
 <file path=customXml/item1.xml><?xml version="1.0" encoding="utf-8"?>
-<p:properties xmlns:p="http://schemas.microsoft.com/office/2006/metadata/properties" xmlns:xsi="http://www.w3.org/2001/XMLSchema-instance" xmlns:pc="http://schemas.microsoft.com/office/infopath/2007/PartnerControls">
-  <documentManagement>
-    <_Flow_SignoffStatus xmlns="ef624bc2-1644-4d69-8362-5c28ca496374" xsi:nil="true"/>
-  </documentManagement>
-</p:properties>
+<?mso-contentType ?>
+<FormTemplates xmlns="http://schemas.microsoft.com/sharepoint/v3/contenttype/forms">
+  <Display>DocumentLibraryForm</Display>
+  <Edit>DocumentLibraryForm</Edit>
+  <New>DocumentLibraryForm</New>
+</FormTemplates>
 </file>
 
 <file path=customXml/item2.xml><?xml version="1.0" encoding="utf-8"?>
@@ -29585,27 +29723,17 @@
 </file>
 
 <file path=customXml/item3.xml><?xml version="1.0" encoding="utf-8"?>
-<?mso-contentType ?>
-<FormTemplates xmlns="http://schemas.microsoft.com/sharepoint/v3/contenttype/forms">
-  <Display>DocumentLibraryForm</Display>
-  <Edit>DocumentLibraryForm</Edit>
-  <New>DocumentLibraryForm</New>
-</FormTemplates>
+<p:properties xmlns:p="http://schemas.microsoft.com/office/2006/metadata/properties" xmlns:xsi="http://www.w3.org/2001/XMLSchema-instance" xmlns:pc="http://schemas.microsoft.com/office/infopath/2007/PartnerControls">
+  <documentManagement>
+    <_Flow_SignoffStatus xmlns="ef624bc2-1644-4d69-8362-5c28ca496374" xsi:nil="true"/>
+  </documentManagement>
+</p:properties>
 </file>
 
 <file path=customXml/itemProps1.xml><?xml version="1.0" encoding="utf-8"?>
-<ds:datastoreItem xmlns:ds="http://schemas.openxmlformats.org/officeDocument/2006/customXml" ds:itemID="{25DE574B-2CD2-4078-9BEA-2A14717D9698}">
+<ds:datastoreItem xmlns:ds="http://schemas.openxmlformats.org/officeDocument/2006/customXml" ds:itemID="{B00FC41E-FBDE-42E2-B58A-20EBD240A376}">
   <ds:schemaRefs>
-    <ds:schemaRef ds:uri="http://schemas.microsoft.com/office/2006/documentManagement/types"/>
-    <ds:schemaRef ds:uri="ef624bc2-1644-4d69-8362-5c28ca496374"/>
-    <ds:schemaRef ds:uri="http://purl.org/dc/terms/"/>
-    <ds:schemaRef ds:uri="http://purl.org/dc/dcmitype/"/>
-    <ds:schemaRef ds:uri="http://schemas.microsoft.com/office/infopath/2007/PartnerControls"/>
-    <ds:schemaRef ds:uri="http://schemas.openxmlformats.org/package/2006/metadata/core-properties"/>
-    <ds:schemaRef ds:uri="514a554b-82b0-4359-b247-fc84018a95f0"/>
-    <ds:schemaRef ds:uri="http://schemas.microsoft.com/office/2006/metadata/properties"/>
-    <ds:schemaRef ds:uri="http://www.w3.org/XML/1998/namespace"/>
-    <ds:schemaRef ds:uri="http://purl.org/dc/elements/1.1/"/>
+    <ds:schemaRef ds:uri="http://schemas.microsoft.com/sharepoint/v3/contenttype/forms"/>
   </ds:schemaRefs>
 </ds:datastoreItem>
 </file>
@@ -29630,9 +29758,18 @@
 </file>
 
 <file path=customXml/itemProps3.xml><?xml version="1.0" encoding="utf-8"?>
-<ds:datastoreItem xmlns:ds="http://schemas.openxmlformats.org/officeDocument/2006/customXml" ds:itemID="{B00FC41E-FBDE-42E2-B58A-20EBD240A376}">
+<ds:datastoreItem xmlns:ds="http://schemas.openxmlformats.org/officeDocument/2006/customXml" ds:itemID="{25DE574B-2CD2-4078-9BEA-2A14717D9698}">
   <ds:schemaRefs>
-    <ds:schemaRef ds:uri="http://schemas.microsoft.com/sharepoint/v3/contenttype/forms"/>
+    <ds:schemaRef ds:uri="http://schemas.microsoft.com/office/2006/documentManagement/types"/>
+    <ds:schemaRef ds:uri="ef624bc2-1644-4d69-8362-5c28ca496374"/>
+    <ds:schemaRef ds:uri="http://purl.org/dc/terms/"/>
+    <ds:schemaRef ds:uri="http://purl.org/dc/dcmitype/"/>
+    <ds:schemaRef ds:uri="http://schemas.microsoft.com/office/infopath/2007/PartnerControls"/>
+    <ds:schemaRef ds:uri="http://schemas.openxmlformats.org/package/2006/metadata/core-properties"/>
+    <ds:schemaRef ds:uri="514a554b-82b0-4359-b247-fc84018a95f0"/>
+    <ds:schemaRef ds:uri="http://schemas.microsoft.com/office/2006/metadata/properties"/>
+    <ds:schemaRef ds:uri="http://www.w3.org/XML/1998/namespace"/>
+    <ds:schemaRef ds:uri="http://purl.org/dc/elements/1.1/"/>
   </ds:schemaRefs>
 </ds:datastoreItem>
 </file>
</xml_diff>